<commit_message>
Signed-off-by: Raphael Cohen <raphael.cohen@emc.com>
</commit_message>
<xml_diff>
--- a/nlp pipeline.pptx
+++ b/nlp pipeline.pptx
@@ -7285,6 +7285,13 @@
   <p:clrMapOvr>
     <a:masterClrMapping/>
   </p:clrMapOvr>
+  <p:timing>
+    <p:tnLst>
+      <p:par>
+        <p:cTn id="1" dur="indefinite" restart="never" nodeType="tmRoot"/>
+      </p:par>
+    </p:tnLst>
+  </p:timing>
 </p:sld>
 </file>
 
@@ -7482,9 +7489,280 @@
   <p:timing>
     <p:tnLst>
       <p:par>
-        <p:cTn id="1" dur="indefinite" restart="never" nodeType="tmRoot"/>
+        <p:cTn id="1" dur="indefinite" restart="never" nodeType="tmRoot">
+          <p:childTnLst>
+            <p:seq concurrent="1" nextAc="seek">
+              <p:cTn id="2" dur="indefinite" nodeType="mainSeq">
+                <p:childTnLst>
+                  <p:par>
+                    <p:cTn id="3" fill="hold">
+                      <p:stCondLst>
+                        <p:cond delay="indefinite"/>
+                      </p:stCondLst>
+                      <p:childTnLst>
+                        <p:par>
+                          <p:cTn id="4" fill="hold">
+                            <p:stCondLst>
+                              <p:cond delay="0"/>
+                            </p:stCondLst>
+                            <p:childTnLst>
+                              <p:par>
+                                <p:cTn id="5" presetID="1" presetClass="entr" presetSubtype="0" fill="hold" grpId="0" nodeType="clickEffect">
+                                  <p:stCondLst>
+                                    <p:cond delay="0"/>
+                                  </p:stCondLst>
+                                  <p:childTnLst>
+                                    <p:set>
+                                      <p:cBhvr>
+                                        <p:cTn id="6" dur="1" fill="hold">
+                                          <p:stCondLst>
+                                            <p:cond delay="0"/>
+                                          </p:stCondLst>
+                                        </p:cTn>
+                                        <p:tgtEl>
+                                          <p:spTgt spid="7">
+                                            <p:txEl>
+                                              <p:pRg st="0" end="0"/>
+                                            </p:txEl>
+                                          </p:spTgt>
+                                        </p:tgtEl>
+                                        <p:attrNameLst>
+                                          <p:attrName>style.visibility</p:attrName>
+                                        </p:attrNameLst>
+                                      </p:cBhvr>
+                                      <p:to>
+                                        <p:strVal val="visible"/>
+                                      </p:to>
+                                    </p:set>
+                                  </p:childTnLst>
+                                </p:cTn>
+                              </p:par>
+                            </p:childTnLst>
+                          </p:cTn>
+                        </p:par>
+                      </p:childTnLst>
+                    </p:cTn>
+                  </p:par>
+                  <p:par>
+                    <p:cTn id="7" fill="hold">
+                      <p:stCondLst>
+                        <p:cond delay="indefinite"/>
+                      </p:stCondLst>
+                      <p:childTnLst>
+                        <p:par>
+                          <p:cTn id="8" fill="hold">
+                            <p:stCondLst>
+                              <p:cond delay="0"/>
+                            </p:stCondLst>
+                            <p:childTnLst>
+                              <p:par>
+                                <p:cTn id="9" presetID="1" presetClass="entr" presetSubtype="0" fill="hold" grpId="0" nodeType="clickEffect">
+                                  <p:stCondLst>
+                                    <p:cond delay="0"/>
+                                  </p:stCondLst>
+                                  <p:childTnLst>
+                                    <p:set>
+                                      <p:cBhvr>
+                                        <p:cTn id="10" dur="1" fill="hold">
+                                          <p:stCondLst>
+                                            <p:cond delay="0"/>
+                                          </p:stCondLst>
+                                        </p:cTn>
+                                        <p:tgtEl>
+                                          <p:spTgt spid="7">
+                                            <p:txEl>
+                                              <p:pRg st="1" end="1"/>
+                                            </p:txEl>
+                                          </p:spTgt>
+                                        </p:tgtEl>
+                                        <p:attrNameLst>
+                                          <p:attrName>style.visibility</p:attrName>
+                                        </p:attrNameLst>
+                                      </p:cBhvr>
+                                      <p:to>
+                                        <p:strVal val="visible"/>
+                                      </p:to>
+                                    </p:set>
+                                  </p:childTnLst>
+                                </p:cTn>
+                              </p:par>
+                            </p:childTnLst>
+                          </p:cTn>
+                        </p:par>
+                      </p:childTnLst>
+                    </p:cTn>
+                  </p:par>
+                  <p:par>
+                    <p:cTn id="11" fill="hold">
+                      <p:stCondLst>
+                        <p:cond delay="indefinite"/>
+                      </p:stCondLst>
+                      <p:childTnLst>
+                        <p:par>
+                          <p:cTn id="12" fill="hold">
+                            <p:stCondLst>
+                              <p:cond delay="0"/>
+                            </p:stCondLst>
+                            <p:childTnLst>
+                              <p:par>
+                                <p:cTn id="13" presetID="1" presetClass="entr" presetSubtype="0" fill="hold" grpId="0" nodeType="clickEffect">
+                                  <p:stCondLst>
+                                    <p:cond delay="0"/>
+                                  </p:stCondLst>
+                                  <p:childTnLst>
+                                    <p:set>
+                                      <p:cBhvr>
+                                        <p:cTn id="14" dur="1" fill="hold">
+                                          <p:stCondLst>
+                                            <p:cond delay="0"/>
+                                          </p:stCondLst>
+                                        </p:cTn>
+                                        <p:tgtEl>
+                                          <p:spTgt spid="7">
+                                            <p:txEl>
+                                              <p:pRg st="2" end="2"/>
+                                            </p:txEl>
+                                          </p:spTgt>
+                                        </p:tgtEl>
+                                        <p:attrNameLst>
+                                          <p:attrName>style.visibility</p:attrName>
+                                        </p:attrNameLst>
+                                      </p:cBhvr>
+                                      <p:to>
+                                        <p:strVal val="visible"/>
+                                      </p:to>
+                                    </p:set>
+                                  </p:childTnLst>
+                                </p:cTn>
+                              </p:par>
+                            </p:childTnLst>
+                          </p:cTn>
+                        </p:par>
+                      </p:childTnLst>
+                    </p:cTn>
+                  </p:par>
+                  <p:par>
+                    <p:cTn id="15" fill="hold">
+                      <p:stCondLst>
+                        <p:cond delay="indefinite"/>
+                      </p:stCondLst>
+                      <p:childTnLst>
+                        <p:par>
+                          <p:cTn id="16" fill="hold">
+                            <p:stCondLst>
+                              <p:cond delay="0"/>
+                            </p:stCondLst>
+                            <p:childTnLst>
+                              <p:par>
+                                <p:cTn id="17" presetID="1" presetClass="entr" presetSubtype="0" fill="hold" grpId="0" nodeType="clickEffect">
+                                  <p:stCondLst>
+                                    <p:cond delay="0"/>
+                                  </p:stCondLst>
+                                  <p:childTnLst>
+                                    <p:set>
+                                      <p:cBhvr>
+                                        <p:cTn id="18" dur="1" fill="hold">
+                                          <p:stCondLst>
+                                            <p:cond delay="0"/>
+                                          </p:stCondLst>
+                                        </p:cTn>
+                                        <p:tgtEl>
+                                          <p:spTgt spid="7">
+                                            <p:txEl>
+                                              <p:pRg st="3" end="3"/>
+                                            </p:txEl>
+                                          </p:spTgt>
+                                        </p:tgtEl>
+                                        <p:attrNameLst>
+                                          <p:attrName>style.visibility</p:attrName>
+                                        </p:attrNameLst>
+                                      </p:cBhvr>
+                                      <p:to>
+                                        <p:strVal val="visible"/>
+                                      </p:to>
+                                    </p:set>
+                                  </p:childTnLst>
+                                </p:cTn>
+                              </p:par>
+                            </p:childTnLst>
+                          </p:cTn>
+                        </p:par>
+                      </p:childTnLst>
+                    </p:cTn>
+                  </p:par>
+                  <p:par>
+                    <p:cTn id="19" fill="hold">
+                      <p:stCondLst>
+                        <p:cond delay="indefinite"/>
+                      </p:stCondLst>
+                      <p:childTnLst>
+                        <p:par>
+                          <p:cTn id="20" fill="hold">
+                            <p:stCondLst>
+                              <p:cond delay="0"/>
+                            </p:stCondLst>
+                            <p:childTnLst>
+                              <p:par>
+                                <p:cTn id="21" presetID="1" presetClass="entr" presetSubtype="0" fill="hold" grpId="0" nodeType="clickEffect">
+                                  <p:stCondLst>
+                                    <p:cond delay="0"/>
+                                  </p:stCondLst>
+                                  <p:childTnLst>
+                                    <p:set>
+                                      <p:cBhvr>
+                                        <p:cTn id="22" dur="1" fill="hold">
+                                          <p:stCondLst>
+                                            <p:cond delay="0"/>
+                                          </p:stCondLst>
+                                        </p:cTn>
+                                        <p:tgtEl>
+                                          <p:spTgt spid="7">
+                                            <p:txEl>
+                                              <p:pRg st="4" end="4"/>
+                                            </p:txEl>
+                                          </p:spTgt>
+                                        </p:tgtEl>
+                                        <p:attrNameLst>
+                                          <p:attrName>style.visibility</p:attrName>
+                                        </p:attrNameLst>
+                                      </p:cBhvr>
+                                      <p:to>
+                                        <p:strVal val="visible"/>
+                                      </p:to>
+                                    </p:set>
+                                  </p:childTnLst>
+                                </p:cTn>
+                              </p:par>
+                            </p:childTnLst>
+                          </p:cTn>
+                        </p:par>
+                      </p:childTnLst>
+                    </p:cTn>
+                  </p:par>
+                </p:childTnLst>
+              </p:cTn>
+              <p:prevCondLst>
+                <p:cond evt="onPrev" delay="0">
+                  <p:tgtEl>
+                    <p:sldTgt/>
+                  </p:tgtEl>
+                </p:cond>
+              </p:prevCondLst>
+              <p:nextCondLst>
+                <p:cond evt="onNext" delay="0">
+                  <p:tgtEl>
+                    <p:sldTgt/>
+                  </p:tgtEl>
+                </p:cond>
+              </p:nextCondLst>
+            </p:seq>
+          </p:childTnLst>
+        </p:cTn>
       </p:par>
     </p:tnLst>
+    <p:bldLst>
+      <p:bldP spid="7" grpId="0" build="p"/>
+    </p:bldLst>
   </p:timing>
 </p:sld>
 </file>
@@ -7523,7 +7801,23 @@
           <a:p>
             <a:r>
               <a:rPr lang="en-US" dirty="0" smtClean="0"/>
-              <a:t>NLP @ BGU Lab</a:t>
+              <a:t>NLP @ BGU Lab (Yael </a:t>
+            </a:r>
+            <a:r>
+              <a:rPr lang="en-US" dirty="0" err="1" smtClean="0"/>
+              <a:t>Netzer</a:t>
+            </a:r>
+            <a:r>
+              <a:rPr lang="en-US" dirty="0" smtClean="0"/>
+              <a:t>, Inga </a:t>
+            </a:r>
+            <a:r>
+              <a:rPr lang="en-US" dirty="0" err="1" smtClean="0"/>
+              <a:t>Isakov</a:t>
+            </a:r>
+            <a:r>
+              <a:rPr lang="en-US" dirty="0" smtClean="0"/>
+              <a:t>)</a:t>
             </a:r>
             <a:endParaRPr lang="en-US" dirty="0"/>
           </a:p>
@@ -8488,6 +8782,262 @@
   <p:transition>
     <p:fade/>
   </p:transition>
+  <p:timing>
+    <p:tnLst>
+      <p:par>
+        <p:cTn id="1" dur="indefinite" restart="never" nodeType="tmRoot">
+          <p:childTnLst>
+            <p:seq concurrent="1" nextAc="seek">
+              <p:cTn id="2" dur="indefinite" nodeType="mainSeq">
+                <p:childTnLst>
+                  <p:par>
+                    <p:cTn id="3" fill="hold">
+                      <p:stCondLst>
+                        <p:cond delay="indefinite"/>
+                      </p:stCondLst>
+                      <p:childTnLst>
+                        <p:par>
+                          <p:cTn id="4" fill="hold">
+                            <p:stCondLst>
+                              <p:cond delay="0"/>
+                            </p:stCondLst>
+                            <p:childTnLst>
+                              <p:par>
+                                <p:cTn id="5" presetID="1" presetClass="entr" presetSubtype="0" fill="hold" grpId="0" nodeType="clickEffect">
+                                  <p:stCondLst>
+                                    <p:cond delay="0"/>
+                                  </p:stCondLst>
+                                  <p:childTnLst>
+                                    <p:set>
+                                      <p:cBhvr>
+                                        <p:cTn id="6" dur="1" fill="hold">
+                                          <p:stCondLst>
+                                            <p:cond delay="0"/>
+                                          </p:stCondLst>
+                                        </p:cTn>
+                                        <p:tgtEl>
+                                          <p:spTgt spid="4">
+                                            <p:txEl>
+                                              <p:pRg st="0" end="0"/>
+                                            </p:txEl>
+                                          </p:spTgt>
+                                        </p:tgtEl>
+                                        <p:attrNameLst>
+                                          <p:attrName>style.visibility</p:attrName>
+                                        </p:attrNameLst>
+                                      </p:cBhvr>
+                                      <p:to>
+                                        <p:strVal val="visible"/>
+                                      </p:to>
+                                    </p:set>
+                                  </p:childTnLst>
+                                </p:cTn>
+                              </p:par>
+                            </p:childTnLst>
+                          </p:cTn>
+                        </p:par>
+                      </p:childTnLst>
+                    </p:cTn>
+                  </p:par>
+                  <p:par>
+                    <p:cTn id="7" fill="hold">
+                      <p:stCondLst>
+                        <p:cond delay="indefinite"/>
+                      </p:stCondLst>
+                      <p:childTnLst>
+                        <p:par>
+                          <p:cTn id="8" fill="hold">
+                            <p:stCondLst>
+                              <p:cond delay="0"/>
+                            </p:stCondLst>
+                            <p:childTnLst>
+                              <p:par>
+                                <p:cTn id="9" presetID="1" presetClass="entr" presetSubtype="0" fill="hold" grpId="0" nodeType="clickEffect">
+                                  <p:stCondLst>
+                                    <p:cond delay="0"/>
+                                  </p:stCondLst>
+                                  <p:childTnLst>
+                                    <p:set>
+                                      <p:cBhvr>
+                                        <p:cTn id="10" dur="1" fill="hold">
+                                          <p:stCondLst>
+                                            <p:cond delay="0"/>
+                                          </p:stCondLst>
+                                        </p:cTn>
+                                        <p:tgtEl>
+                                          <p:spTgt spid="4">
+                                            <p:txEl>
+                                              <p:pRg st="1" end="1"/>
+                                            </p:txEl>
+                                          </p:spTgt>
+                                        </p:tgtEl>
+                                        <p:attrNameLst>
+                                          <p:attrName>style.visibility</p:attrName>
+                                        </p:attrNameLst>
+                                      </p:cBhvr>
+                                      <p:to>
+                                        <p:strVal val="visible"/>
+                                      </p:to>
+                                    </p:set>
+                                  </p:childTnLst>
+                                </p:cTn>
+                              </p:par>
+                            </p:childTnLst>
+                          </p:cTn>
+                        </p:par>
+                      </p:childTnLst>
+                    </p:cTn>
+                  </p:par>
+                  <p:par>
+                    <p:cTn id="11" fill="hold">
+                      <p:stCondLst>
+                        <p:cond delay="indefinite"/>
+                      </p:stCondLst>
+                      <p:childTnLst>
+                        <p:par>
+                          <p:cTn id="12" fill="hold">
+                            <p:stCondLst>
+                              <p:cond delay="0"/>
+                            </p:stCondLst>
+                            <p:childTnLst>
+                              <p:par>
+                                <p:cTn id="13" presetID="1" presetClass="entr" presetSubtype="0" fill="hold" grpId="0" nodeType="clickEffect">
+                                  <p:stCondLst>
+                                    <p:cond delay="0"/>
+                                  </p:stCondLst>
+                                  <p:childTnLst>
+                                    <p:set>
+                                      <p:cBhvr>
+                                        <p:cTn id="14" dur="1" fill="hold">
+                                          <p:stCondLst>
+                                            <p:cond delay="0"/>
+                                          </p:stCondLst>
+                                        </p:cTn>
+                                        <p:tgtEl>
+                                          <p:spTgt spid="4">
+                                            <p:txEl>
+                                              <p:pRg st="2" end="2"/>
+                                            </p:txEl>
+                                          </p:spTgt>
+                                        </p:tgtEl>
+                                        <p:attrNameLst>
+                                          <p:attrName>style.visibility</p:attrName>
+                                        </p:attrNameLst>
+                                      </p:cBhvr>
+                                      <p:to>
+                                        <p:strVal val="visible"/>
+                                      </p:to>
+                                    </p:set>
+                                  </p:childTnLst>
+                                </p:cTn>
+                              </p:par>
+                            </p:childTnLst>
+                          </p:cTn>
+                        </p:par>
+                      </p:childTnLst>
+                    </p:cTn>
+                  </p:par>
+                  <p:par>
+                    <p:cTn id="15" fill="hold">
+                      <p:stCondLst>
+                        <p:cond delay="indefinite"/>
+                      </p:stCondLst>
+                      <p:childTnLst>
+                        <p:par>
+                          <p:cTn id="16" fill="hold">
+                            <p:stCondLst>
+                              <p:cond delay="0"/>
+                            </p:stCondLst>
+                            <p:childTnLst>
+                              <p:par>
+                                <p:cTn id="17" presetID="1" presetClass="entr" presetSubtype="0" fill="hold" grpId="0" nodeType="clickEffect">
+                                  <p:stCondLst>
+                                    <p:cond delay="0"/>
+                                  </p:stCondLst>
+                                  <p:childTnLst>
+                                    <p:set>
+                                      <p:cBhvr>
+                                        <p:cTn id="18" dur="1" fill="hold">
+                                          <p:stCondLst>
+                                            <p:cond delay="0"/>
+                                          </p:stCondLst>
+                                        </p:cTn>
+                                        <p:tgtEl>
+                                          <p:spTgt spid="4">
+                                            <p:txEl>
+                                              <p:pRg st="3" end="3"/>
+                                            </p:txEl>
+                                          </p:spTgt>
+                                        </p:tgtEl>
+                                        <p:attrNameLst>
+                                          <p:attrName>style.visibility</p:attrName>
+                                        </p:attrNameLst>
+                                      </p:cBhvr>
+                                      <p:to>
+                                        <p:strVal val="visible"/>
+                                      </p:to>
+                                    </p:set>
+                                  </p:childTnLst>
+                                </p:cTn>
+                              </p:par>
+                              <p:par>
+                                <p:cTn id="19" presetID="1" presetClass="entr" presetSubtype="0" fill="hold" nodeType="withEffect">
+                                  <p:stCondLst>
+                                    <p:cond delay="0"/>
+                                  </p:stCondLst>
+                                  <p:childTnLst>
+                                    <p:set>
+                                      <p:cBhvr>
+                                        <p:cTn id="20" dur="1" fill="hold">
+                                          <p:stCondLst>
+                                            <p:cond delay="0"/>
+                                          </p:stCondLst>
+                                        </p:cTn>
+                                        <p:tgtEl>
+                                          <p:spTgt spid="355"/>
+                                        </p:tgtEl>
+                                        <p:attrNameLst>
+                                          <p:attrName>style.visibility</p:attrName>
+                                        </p:attrNameLst>
+                                      </p:cBhvr>
+                                      <p:to>
+                                        <p:strVal val="visible"/>
+                                      </p:to>
+                                    </p:set>
+                                  </p:childTnLst>
+                                </p:cTn>
+                              </p:par>
+                            </p:childTnLst>
+                          </p:cTn>
+                        </p:par>
+                      </p:childTnLst>
+                    </p:cTn>
+                  </p:par>
+                </p:childTnLst>
+              </p:cTn>
+              <p:prevCondLst>
+                <p:cond evt="onPrev" delay="0">
+                  <p:tgtEl>
+                    <p:sldTgt/>
+                  </p:tgtEl>
+                </p:cond>
+              </p:prevCondLst>
+              <p:nextCondLst>
+                <p:cond evt="onNext" delay="0">
+                  <p:tgtEl>
+                    <p:sldTgt/>
+                  </p:tgtEl>
+                </p:cond>
+              </p:nextCondLst>
+            </p:seq>
+          </p:childTnLst>
+        </p:cTn>
+      </p:par>
+    </p:tnLst>
+    <p:bldLst>
+      <p:bldP spid="4" grpId="0" uiExpand="1" build="p"/>
+    </p:bldLst>
+  </p:timing>
 </p:sld>
 </file>
 
@@ -8684,6 +9234,13 @@
   <p:transition>
     <p:fade/>
   </p:transition>
+  <p:timing>
+    <p:tnLst>
+      <p:par>
+        <p:cTn id="1" dur="indefinite" restart="never" nodeType="tmRoot"/>
+      </p:par>
+    </p:tnLst>
+  </p:timing>
 </p:sld>
 </file>
 
@@ -8793,22 +9350,14 @@
           <a:p>
             <a:r>
               <a:rPr lang="en-US" dirty="0" smtClean="0"/>
-              <a:t>Also, be </a:t>
-            </a:r>
-            <a:r>
-              <a:rPr lang="en-US" smtClean="0"/>
-              <a:t>careful </a:t>
+              <a:t>Also, be careful </a:t>
             </a:r>
             <a:br>
-              <a:rPr lang="en-US" smtClean="0"/>
+              <a:rPr lang="en-US" dirty="0" smtClean="0"/>
             </a:br>
             <a:r>
-              <a:rPr lang="en-US" smtClean="0"/>
-              <a:t>dividing </a:t>
-            </a:r>
-            <a:r>
               <a:rPr lang="en-US" dirty="0" smtClean="0"/>
-              <a:t>train/test</a:t>
+              <a:t>dividing train/test</a:t>
             </a:r>
           </a:p>
           <a:p>
@@ -8870,6 +9419,186 @@
   <p:transition>
     <p:fade/>
   </p:transition>
+  <p:timing>
+    <p:tnLst>
+      <p:par>
+        <p:cTn id="1" dur="indefinite" restart="never" nodeType="tmRoot">
+          <p:childTnLst>
+            <p:seq concurrent="1" nextAc="seek">
+              <p:cTn id="2" dur="indefinite" nodeType="mainSeq">
+                <p:childTnLst>
+                  <p:par>
+                    <p:cTn id="3" fill="hold">
+                      <p:stCondLst>
+                        <p:cond delay="indefinite"/>
+                      </p:stCondLst>
+                      <p:childTnLst>
+                        <p:par>
+                          <p:cTn id="4" fill="hold">
+                            <p:stCondLst>
+                              <p:cond delay="0"/>
+                            </p:stCondLst>
+                            <p:childTnLst>
+                              <p:par>
+                                <p:cTn id="5" presetID="1" presetClass="entr" presetSubtype="0" fill="hold" grpId="0" nodeType="clickEffect">
+                                  <p:stCondLst>
+                                    <p:cond delay="0"/>
+                                  </p:stCondLst>
+                                  <p:childTnLst>
+                                    <p:set>
+                                      <p:cBhvr>
+                                        <p:cTn id="6" dur="1" fill="hold">
+                                          <p:stCondLst>
+                                            <p:cond delay="0"/>
+                                          </p:stCondLst>
+                                        </p:cTn>
+                                        <p:tgtEl>
+                                          <p:spTgt spid="4">
+                                            <p:txEl>
+                                              <p:pRg st="0" end="0"/>
+                                            </p:txEl>
+                                          </p:spTgt>
+                                        </p:tgtEl>
+                                        <p:attrNameLst>
+                                          <p:attrName>style.visibility</p:attrName>
+                                        </p:attrNameLst>
+                                      </p:cBhvr>
+                                      <p:to>
+                                        <p:strVal val="visible"/>
+                                      </p:to>
+                                    </p:set>
+                                  </p:childTnLst>
+                                </p:cTn>
+                              </p:par>
+                            </p:childTnLst>
+                          </p:cTn>
+                        </p:par>
+                      </p:childTnLst>
+                    </p:cTn>
+                  </p:par>
+                  <p:par>
+                    <p:cTn id="7" fill="hold">
+                      <p:stCondLst>
+                        <p:cond delay="indefinite"/>
+                      </p:stCondLst>
+                      <p:childTnLst>
+                        <p:par>
+                          <p:cTn id="8" fill="hold">
+                            <p:stCondLst>
+                              <p:cond delay="0"/>
+                            </p:stCondLst>
+                            <p:childTnLst>
+                              <p:par>
+                                <p:cTn id="9" presetID="1" presetClass="entr" presetSubtype="0" fill="hold" grpId="0" nodeType="clickEffect">
+                                  <p:stCondLst>
+                                    <p:cond delay="0"/>
+                                  </p:stCondLst>
+                                  <p:childTnLst>
+                                    <p:set>
+                                      <p:cBhvr>
+                                        <p:cTn id="10" dur="1" fill="hold">
+                                          <p:stCondLst>
+                                            <p:cond delay="0"/>
+                                          </p:stCondLst>
+                                        </p:cTn>
+                                        <p:tgtEl>
+                                          <p:spTgt spid="4">
+                                            <p:txEl>
+                                              <p:pRg st="1" end="1"/>
+                                            </p:txEl>
+                                          </p:spTgt>
+                                        </p:tgtEl>
+                                        <p:attrNameLst>
+                                          <p:attrName>style.visibility</p:attrName>
+                                        </p:attrNameLst>
+                                      </p:cBhvr>
+                                      <p:to>
+                                        <p:strVal val="visible"/>
+                                      </p:to>
+                                    </p:set>
+                                  </p:childTnLst>
+                                </p:cTn>
+                              </p:par>
+                            </p:childTnLst>
+                          </p:cTn>
+                        </p:par>
+                      </p:childTnLst>
+                    </p:cTn>
+                  </p:par>
+                  <p:par>
+                    <p:cTn id="11" fill="hold">
+                      <p:stCondLst>
+                        <p:cond delay="indefinite"/>
+                      </p:stCondLst>
+                      <p:childTnLst>
+                        <p:par>
+                          <p:cTn id="12" fill="hold">
+                            <p:stCondLst>
+                              <p:cond delay="0"/>
+                            </p:stCondLst>
+                            <p:childTnLst>
+                              <p:par>
+                                <p:cTn id="13" presetID="1" presetClass="entr" presetSubtype="0" fill="hold" grpId="0" nodeType="clickEffect">
+                                  <p:stCondLst>
+                                    <p:cond delay="0"/>
+                                  </p:stCondLst>
+                                  <p:childTnLst>
+                                    <p:set>
+                                      <p:cBhvr>
+                                        <p:cTn id="14" dur="1" fill="hold">
+                                          <p:stCondLst>
+                                            <p:cond delay="0"/>
+                                          </p:stCondLst>
+                                        </p:cTn>
+                                        <p:tgtEl>
+                                          <p:spTgt spid="4">
+                                            <p:txEl>
+                                              <p:pRg st="2" end="2"/>
+                                            </p:txEl>
+                                          </p:spTgt>
+                                        </p:tgtEl>
+                                        <p:attrNameLst>
+                                          <p:attrName>style.visibility</p:attrName>
+                                        </p:attrNameLst>
+                                      </p:cBhvr>
+                                      <p:to>
+                                        <p:strVal val="visible"/>
+                                      </p:to>
+                                    </p:set>
+                                  </p:childTnLst>
+                                </p:cTn>
+                              </p:par>
+                            </p:childTnLst>
+                          </p:cTn>
+                        </p:par>
+                      </p:childTnLst>
+                    </p:cTn>
+                  </p:par>
+                </p:childTnLst>
+              </p:cTn>
+              <p:prevCondLst>
+                <p:cond evt="onPrev" delay="0">
+                  <p:tgtEl>
+                    <p:sldTgt/>
+                  </p:tgtEl>
+                </p:cond>
+              </p:prevCondLst>
+              <p:nextCondLst>
+                <p:cond evt="onNext" delay="0">
+                  <p:tgtEl>
+                    <p:sldTgt/>
+                  </p:tgtEl>
+                </p:cond>
+              </p:nextCondLst>
+            </p:seq>
+          </p:childTnLst>
+        </p:cTn>
+      </p:par>
+    </p:tnLst>
+    <p:bldLst>
+      <p:bldP spid="4" grpId="0" build="p"/>
+    </p:bldLst>
+  </p:timing>
 </p:sld>
 </file>
 
@@ -8946,7 +9675,12 @@
             <p:ph sz="quarter" idx="10"/>
           </p:nvPr>
         </p:nvSpPr>
-        <p:spPr/>
+        <p:spPr>
+          <a:xfrm>
+            <a:off x="366715" y="1323974"/>
+            <a:ext cx="8410574" cy="3038475"/>
+          </a:xfrm>
+        </p:spPr>
         <p:txBody>
           <a:bodyPr/>
           <a:lstStyle/>
@@ -8976,6 +9710,17 @@
               <a:rPr lang="en-US" dirty="0" smtClean="0"/>
               <a:t>Wrapping the Analyzer in Hadoop or other distributed API</a:t>
             </a:r>
+          </a:p>
+          <a:p>
+            <a:r>
+              <a:rPr lang="en-US" dirty="0" smtClean="0"/>
+              <a:t>Medical </a:t>
+            </a:r>
+            <a:r>
+              <a:rPr lang="en-US" dirty="0" err="1" smtClean="0"/>
+              <a:t>FrameNet</a:t>
+            </a:r>
+            <a:endParaRPr lang="en-US" dirty="0" smtClean="0"/>
           </a:p>
           <a:p>
             <a:r>
@@ -9001,6 +9746,333 @@
   <p:transition>
     <p:fade/>
   </p:transition>
+  <p:timing>
+    <p:tnLst>
+      <p:par>
+        <p:cTn id="1" dur="indefinite" restart="never" nodeType="tmRoot">
+          <p:childTnLst>
+            <p:seq concurrent="1" nextAc="seek">
+              <p:cTn id="2" dur="indefinite" nodeType="mainSeq">
+                <p:childTnLst>
+                  <p:par>
+                    <p:cTn id="3" fill="hold">
+                      <p:stCondLst>
+                        <p:cond delay="indefinite"/>
+                      </p:stCondLst>
+                      <p:childTnLst>
+                        <p:par>
+                          <p:cTn id="4" fill="hold">
+                            <p:stCondLst>
+                              <p:cond delay="0"/>
+                            </p:stCondLst>
+                            <p:childTnLst>
+                              <p:par>
+                                <p:cTn id="5" presetID="1" presetClass="entr" presetSubtype="0" fill="hold" grpId="0" nodeType="clickEffect">
+                                  <p:stCondLst>
+                                    <p:cond delay="0"/>
+                                  </p:stCondLst>
+                                  <p:childTnLst>
+                                    <p:set>
+                                      <p:cBhvr>
+                                        <p:cTn id="6" dur="1" fill="hold">
+                                          <p:stCondLst>
+                                            <p:cond delay="0"/>
+                                          </p:stCondLst>
+                                        </p:cTn>
+                                        <p:tgtEl>
+                                          <p:spTgt spid="4">
+                                            <p:txEl>
+                                              <p:pRg st="0" end="0"/>
+                                            </p:txEl>
+                                          </p:spTgt>
+                                        </p:tgtEl>
+                                        <p:attrNameLst>
+                                          <p:attrName>style.visibility</p:attrName>
+                                        </p:attrNameLst>
+                                      </p:cBhvr>
+                                      <p:to>
+                                        <p:strVal val="visible"/>
+                                      </p:to>
+                                    </p:set>
+                                  </p:childTnLst>
+                                </p:cTn>
+                              </p:par>
+                            </p:childTnLst>
+                          </p:cTn>
+                        </p:par>
+                      </p:childTnLst>
+                    </p:cTn>
+                  </p:par>
+                  <p:par>
+                    <p:cTn id="7" fill="hold">
+                      <p:stCondLst>
+                        <p:cond delay="indefinite"/>
+                      </p:stCondLst>
+                      <p:childTnLst>
+                        <p:par>
+                          <p:cTn id="8" fill="hold">
+                            <p:stCondLst>
+                              <p:cond delay="0"/>
+                            </p:stCondLst>
+                            <p:childTnLst>
+                              <p:par>
+                                <p:cTn id="9" presetID="1" presetClass="entr" presetSubtype="0" fill="hold" grpId="0" nodeType="clickEffect">
+                                  <p:stCondLst>
+                                    <p:cond delay="0"/>
+                                  </p:stCondLst>
+                                  <p:childTnLst>
+                                    <p:set>
+                                      <p:cBhvr>
+                                        <p:cTn id="10" dur="1" fill="hold">
+                                          <p:stCondLst>
+                                            <p:cond delay="0"/>
+                                          </p:stCondLst>
+                                        </p:cTn>
+                                        <p:tgtEl>
+                                          <p:spTgt spid="4">
+                                            <p:txEl>
+                                              <p:pRg st="1" end="1"/>
+                                            </p:txEl>
+                                          </p:spTgt>
+                                        </p:tgtEl>
+                                        <p:attrNameLst>
+                                          <p:attrName>style.visibility</p:attrName>
+                                        </p:attrNameLst>
+                                      </p:cBhvr>
+                                      <p:to>
+                                        <p:strVal val="visible"/>
+                                      </p:to>
+                                    </p:set>
+                                  </p:childTnLst>
+                                </p:cTn>
+                              </p:par>
+                            </p:childTnLst>
+                          </p:cTn>
+                        </p:par>
+                      </p:childTnLst>
+                    </p:cTn>
+                  </p:par>
+                  <p:par>
+                    <p:cTn id="11" fill="hold">
+                      <p:stCondLst>
+                        <p:cond delay="indefinite"/>
+                      </p:stCondLst>
+                      <p:childTnLst>
+                        <p:par>
+                          <p:cTn id="12" fill="hold">
+                            <p:stCondLst>
+                              <p:cond delay="0"/>
+                            </p:stCondLst>
+                            <p:childTnLst>
+                              <p:par>
+                                <p:cTn id="13" presetID="1" presetClass="entr" presetSubtype="0" fill="hold" grpId="0" nodeType="clickEffect">
+                                  <p:stCondLst>
+                                    <p:cond delay="0"/>
+                                  </p:stCondLst>
+                                  <p:childTnLst>
+                                    <p:set>
+                                      <p:cBhvr>
+                                        <p:cTn id="14" dur="1" fill="hold">
+                                          <p:stCondLst>
+                                            <p:cond delay="0"/>
+                                          </p:stCondLst>
+                                        </p:cTn>
+                                        <p:tgtEl>
+                                          <p:spTgt spid="4">
+                                            <p:txEl>
+                                              <p:pRg st="2" end="2"/>
+                                            </p:txEl>
+                                          </p:spTgt>
+                                        </p:tgtEl>
+                                        <p:attrNameLst>
+                                          <p:attrName>style.visibility</p:attrName>
+                                        </p:attrNameLst>
+                                      </p:cBhvr>
+                                      <p:to>
+                                        <p:strVal val="visible"/>
+                                      </p:to>
+                                    </p:set>
+                                  </p:childTnLst>
+                                </p:cTn>
+                              </p:par>
+                            </p:childTnLst>
+                          </p:cTn>
+                        </p:par>
+                      </p:childTnLst>
+                    </p:cTn>
+                  </p:par>
+                  <p:par>
+                    <p:cTn id="15" fill="hold">
+                      <p:stCondLst>
+                        <p:cond delay="indefinite"/>
+                      </p:stCondLst>
+                      <p:childTnLst>
+                        <p:par>
+                          <p:cTn id="16" fill="hold">
+                            <p:stCondLst>
+                              <p:cond delay="0"/>
+                            </p:stCondLst>
+                            <p:childTnLst>
+                              <p:par>
+                                <p:cTn id="17" presetID="1" presetClass="entr" presetSubtype="0" fill="hold" grpId="0" nodeType="clickEffect">
+                                  <p:stCondLst>
+                                    <p:cond delay="0"/>
+                                  </p:stCondLst>
+                                  <p:childTnLst>
+                                    <p:set>
+                                      <p:cBhvr>
+                                        <p:cTn id="18" dur="1" fill="hold">
+                                          <p:stCondLst>
+                                            <p:cond delay="0"/>
+                                          </p:stCondLst>
+                                        </p:cTn>
+                                        <p:tgtEl>
+                                          <p:spTgt spid="4">
+                                            <p:txEl>
+                                              <p:pRg st="3" end="3"/>
+                                            </p:txEl>
+                                          </p:spTgt>
+                                        </p:tgtEl>
+                                        <p:attrNameLst>
+                                          <p:attrName>style.visibility</p:attrName>
+                                        </p:attrNameLst>
+                                      </p:cBhvr>
+                                      <p:to>
+                                        <p:strVal val="visible"/>
+                                      </p:to>
+                                    </p:set>
+                                  </p:childTnLst>
+                                </p:cTn>
+                              </p:par>
+                            </p:childTnLst>
+                          </p:cTn>
+                        </p:par>
+                      </p:childTnLst>
+                    </p:cTn>
+                  </p:par>
+                  <p:par>
+                    <p:cTn id="19" fill="hold">
+                      <p:stCondLst>
+                        <p:cond delay="indefinite"/>
+                      </p:stCondLst>
+                      <p:childTnLst>
+                        <p:par>
+                          <p:cTn id="20" fill="hold">
+                            <p:stCondLst>
+                              <p:cond delay="0"/>
+                            </p:stCondLst>
+                            <p:childTnLst>
+                              <p:par>
+                                <p:cTn id="21" presetID="1" presetClass="entr" presetSubtype="0" fill="hold" grpId="0" nodeType="clickEffect">
+                                  <p:stCondLst>
+                                    <p:cond delay="0"/>
+                                  </p:stCondLst>
+                                  <p:childTnLst>
+                                    <p:set>
+                                      <p:cBhvr>
+                                        <p:cTn id="22" dur="1" fill="hold">
+                                          <p:stCondLst>
+                                            <p:cond delay="0"/>
+                                          </p:stCondLst>
+                                        </p:cTn>
+                                        <p:tgtEl>
+                                          <p:spTgt spid="4">
+                                            <p:txEl>
+                                              <p:pRg st="4" end="4"/>
+                                            </p:txEl>
+                                          </p:spTgt>
+                                        </p:tgtEl>
+                                        <p:attrNameLst>
+                                          <p:attrName>style.visibility</p:attrName>
+                                        </p:attrNameLst>
+                                      </p:cBhvr>
+                                      <p:to>
+                                        <p:strVal val="visible"/>
+                                      </p:to>
+                                    </p:set>
+                                  </p:childTnLst>
+                                </p:cTn>
+                              </p:par>
+                            </p:childTnLst>
+                          </p:cTn>
+                        </p:par>
+                      </p:childTnLst>
+                    </p:cTn>
+                  </p:par>
+                  <p:par>
+                    <p:cTn id="23" fill="hold">
+                      <p:stCondLst>
+                        <p:cond delay="indefinite"/>
+                      </p:stCondLst>
+                      <p:childTnLst>
+                        <p:par>
+                          <p:cTn id="24" fill="hold">
+                            <p:stCondLst>
+                              <p:cond delay="0"/>
+                            </p:stCondLst>
+                            <p:childTnLst>
+                              <p:par>
+                                <p:cTn id="25" presetID="1" presetClass="entr" presetSubtype="0" fill="hold" grpId="0" nodeType="clickEffect">
+                                  <p:stCondLst>
+                                    <p:cond delay="0"/>
+                                  </p:stCondLst>
+                                  <p:childTnLst>
+                                    <p:set>
+                                      <p:cBhvr>
+                                        <p:cTn id="26" dur="1" fill="hold">
+                                          <p:stCondLst>
+                                            <p:cond delay="0"/>
+                                          </p:stCondLst>
+                                        </p:cTn>
+                                        <p:tgtEl>
+                                          <p:spTgt spid="4">
+                                            <p:txEl>
+                                              <p:pRg st="5" end="5"/>
+                                            </p:txEl>
+                                          </p:spTgt>
+                                        </p:tgtEl>
+                                        <p:attrNameLst>
+                                          <p:attrName>style.visibility</p:attrName>
+                                        </p:attrNameLst>
+                                      </p:cBhvr>
+                                      <p:to>
+                                        <p:strVal val="visible"/>
+                                      </p:to>
+                                    </p:set>
+                                  </p:childTnLst>
+                                </p:cTn>
+                              </p:par>
+                            </p:childTnLst>
+                          </p:cTn>
+                        </p:par>
+                      </p:childTnLst>
+                    </p:cTn>
+                  </p:par>
+                </p:childTnLst>
+              </p:cTn>
+              <p:prevCondLst>
+                <p:cond evt="onPrev" delay="0">
+                  <p:tgtEl>
+                    <p:sldTgt/>
+                  </p:tgtEl>
+                </p:cond>
+              </p:prevCondLst>
+              <p:nextCondLst>
+                <p:cond evt="onNext" delay="0">
+                  <p:tgtEl>
+                    <p:sldTgt/>
+                  </p:tgtEl>
+                </p:cond>
+              </p:nextCondLst>
+            </p:seq>
+          </p:childTnLst>
+        </p:cTn>
+      </p:par>
+    </p:tnLst>
+    <p:bldLst>
+      <p:bldP spid="4" grpId="0" build="p"/>
+    </p:bldLst>
+  </p:timing>
 </p:sld>
 </file>
 
@@ -9175,9 +10247,469 @@
   <p:timing>
     <p:tnLst>
       <p:par>
-        <p:cTn id="1" dur="indefinite" restart="never" nodeType="tmRoot"/>
+        <p:cTn id="1" dur="indefinite" restart="never" nodeType="tmRoot">
+          <p:childTnLst>
+            <p:seq concurrent="1" nextAc="seek">
+              <p:cTn id="2" dur="indefinite" nodeType="mainSeq">
+                <p:childTnLst>
+                  <p:par>
+                    <p:cTn id="3" fill="hold">
+                      <p:stCondLst>
+                        <p:cond delay="indefinite"/>
+                      </p:stCondLst>
+                      <p:childTnLst>
+                        <p:par>
+                          <p:cTn id="4" fill="hold">
+                            <p:stCondLst>
+                              <p:cond delay="0"/>
+                            </p:stCondLst>
+                            <p:childTnLst>
+                              <p:par>
+                                <p:cTn id="5" presetID="10" presetClass="entr" presetSubtype="0" fill="hold" grpId="0" nodeType="clickEffect">
+                                  <p:stCondLst>
+                                    <p:cond delay="0"/>
+                                  </p:stCondLst>
+                                  <p:childTnLst>
+                                    <p:set>
+                                      <p:cBhvr>
+                                        <p:cTn id="6" dur="1" fill="hold">
+                                          <p:stCondLst>
+                                            <p:cond delay="0"/>
+                                          </p:stCondLst>
+                                        </p:cTn>
+                                        <p:tgtEl>
+                                          <p:spTgt spid="4">
+                                            <p:txEl>
+                                              <p:pRg st="0" end="0"/>
+                                            </p:txEl>
+                                          </p:spTgt>
+                                        </p:tgtEl>
+                                        <p:attrNameLst>
+                                          <p:attrName>style.visibility</p:attrName>
+                                        </p:attrNameLst>
+                                      </p:cBhvr>
+                                      <p:to>
+                                        <p:strVal val="visible"/>
+                                      </p:to>
+                                    </p:set>
+                                    <p:animEffect transition="in" filter="fade">
+                                      <p:cBhvr>
+                                        <p:cTn id="7" dur="500"/>
+                                        <p:tgtEl>
+                                          <p:spTgt spid="4">
+                                            <p:txEl>
+                                              <p:pRg st="0" end="0"/>
+                                            </p:txEl>
+                                          </p:spTgt>
+                                        </p:tgtEl>
+                                      </p:cBhvr>
+                                    </p:animEffect>
+                                  </p:childTnLst>
+                                </p:cTn>
+                              </p:par>
+                            </p:childTnLst>
+                          </p:cTn>
+                        </p:par>
+                      </p:childTnLst>
+                    </p:cTn>
+                  </p:par>
+                  <p:par>
+                    <p:cTn id="8" fill="hold">
+                      <p:stCondLst>
+                        <p:cond delay="indefinite"/>
+                      </p:stCondLst>
+                      <p:childTnLst>
+                        <p:par>
+                          <p:cTn id="9" fill="hold">
+                            <p:stCondLst>
+                              <p:cond delay="0"/>
+                            </p:stCondLst>
+                            <p:childTnLst>
+                              <p:par>
+                                <p:cTn id="10" presetID="10" presetClass="entr" presetSubtype="0" fill="hold" grpId="0" nodeType="clickEffect">
+                                  <p:stCondLst>
+                                    <p:cond delay="0"/>
+                                  </p:stCondLst>
+                                  <p:childTnLst>
+                                    <p:set>
+                                      <p:cBhvr>
+                                        <p:cTn id="11" dur="1" fill="hold">
+                                          <p:stCondLst>
+                                            <p:cond delay="0"/>
+                                          </p:stCondLst>
+                                        </p:cTn>
+                                        <p:tgtEl>
+                                          <p:spTgt spid="4">
+                                            <p:txEl>
+                                              <p:pRg st="1" end="1"/>
+                                            </p:txEl>
+                                          </p:spTgt>
+                                        </p:tgtEl>
+                                        <p:attrNameLst>
+                                          <p:attrName>style.visibility</p:attrName>
+                                        </p:attrNameLst>
+                                      </p:cBhvr>
+                                      <p:to>
+                                        <p:strVal val="visible"/>
+                                      </p:to>
+                                    </p:set>
+                                    <p:animEffect transition="in" filter="fade">
+                                      <p:cBhvr>
+                                        <p:cTn id="12" dur="500"/>
+                                        <p:tgtEl>
+                                          <p:spTgt spid="4">
+                                            <p:txEl>
+                                              <p:pRg st="1" end="1"/>
+                                            </p:txEl>
+                                          </p:spTgt>
+                                        </p:tgtEl>
+                                      </p:cBhvr>
+                                    </p:animEffect>
+                                  </p:childTnLst>
+                                </p:cTn>
+                              </p:par>
+                              <p:par>
+                                <p:cTn id="13" presetID="10" presetClass="entr" presetSubtype="0" fill="hold" grpId="0" nodeType="withEffect">
+                                  <p:stCondLst>
+                                    <p:cond delay="0"/>
+                                  </p:stCondLst>
+                                  <p:childTnLst>
+                                    <p:set>
+                                      <p:cBhvr>
+                                        <p:cTn id="14" dur="1" fill="hold">
+                                          <p:stCondLst>
+                                            <p:cond delay="0"/>
+                                          </p:stCondLst>
+                                        </p:cTn>
+                                        <p:tgtEl>
+                                          <p:spTgt spid="4">
+                                            <p:txEl>
+                                              <p:pRg st="2" end="2"/>
+                                            </p:txEl>
+                                          </p:spTgt>
+                                        </p:tgtEl>
+                                        <p:attrNameLst>
+                                          <p:attrName>style.visibility</p:attrName>
+                                        </p:attrNameLst>
+                                      </p:cBhvr>
+                                      <p:to>
+                                        <p:strVal val="visible"/>
+                                      </p:to>
+                                    </p:set>
+                                    <p:animEffect transition="in" filter="fade">
+                                      <p:cBhvr>
+                                        <p:cTn id="15" dur="500"/>
+                                        <p:tgtEl>
+                                          <p:spTgt spid="4">
+                                            <p:txEl>
+                                              <p:pRg st="2" end="2"/>
+                                            </p:txEl>
+                                          </p:spTgt>
+                                        </p:tgtEl>
+                                      </p:cBhvr>
+                                    </p:animEffect>
+                                  </p:childTnLst>
+                                </p:cTn>
+                              </p:par>
+                              <p:par>
+                                <p:cTn id="16" presetID="10" presetClass="entr" presetSubtype="0" fill="hold" grpId="0" nodeType="withEffect">
+                                  <p:stCondLst>
+                                    <p:cond delay="0"/>
+                                  </p:stCondLst>
+                                  <p:childTnLst>
+                                    <p:set>
+                                      <p:cBhvr>
+                                        <p:cTn id="17" dur="1" fill="hold">
+                                          <p:stCondLst>
+                                            <p:cond delay="0"/>
+                                          </p:stCondLst>
+                                        </p:cTn>
+                                        <p:tgtEl>
+                                          <p:spTgt spid="4">
+                                            <p:txEl>
+                                              <p:pRg st="3" end="3"/>
+                                            </p:txEl>
+                                          </p:spTgt>
+                                        </p:tgtEl>
+                                        <p:attrNameLst>
+                                          <p:attrName>style.visibility</p:attrName>
+                                        </p:attrNameLst>
+                                      </p:cBhvr>
+                                      <p:to>
+                                        <p:strVal val="visible"/>
+                                      </p:to>
+                                    </p:set>
+                                    <p:animEffect transition="in" filter="fade">
+                                      <p:cBhvr>
+                                        <p:cTn id="18" dur="500"/>
+                                        <p:tgtEl>
+                                          <p:spTgt spid="4">
+                                            <p:txEl>
+                                              <p:pRg st="3" end="3"/>
+                                            </p:txEl>
+                                          </p:spTgt>
+                                        </p:tgtEl>
+                                      </p:cBhvr>
+                                    </p:animEffect>
+                                  </p:childTnLst>
+                                </p:cTn>
+                              </p:par>
+                              <p:par>
+                                <p:cTn id="19" presetID="10" presetClass="entr" presetSubtype="0" fill="hold" grpId="0" nodeType="withEffect">
+                                  <p:stCondLst>
+                                    <p:cond delay="0"/>
+                                  </p:stCondLst>
+                                  <p:childTnLst>
+                                    <p:set>
+                                      <p:cBhvr>
+                                        <p:cTn id="20" dur="1" fill="hold">
+                                          <p:stCondLst>
+                                            <p:cond delay="0"/>
+                                          </p:stCondLst>
+                                        </p:cTn>
+                                        <p:tgtEl>
+                                          <p:spTgt spid="4">
+                                            <p:txEl>
+                                              <p:pRg st="4" end="4"/>
+                                            </p:txEl>
+                                          </p:spTgt>
+                                        </p:tgtEl>
+                                        <p:attrNameLst>
+                                          <p:attrName>style.visibility</p:attrName>
+                                        </p:attrNameLst>
+                                      </p:cBhvr>
+                                      <p:to>
+                                        <p:strVal val="visible"/>
+                                      </p:to>
+                                    </p:set>
+                                    <p:animEffect transition="in" filter="fade">
+                                      <p:cBhvr>
+                                        <p:cTn id="21" dur="500"/>
+                                        <p:tgtEl>
+                                          <p:spTgt spid="4">
+                                            <p:txEl>
+                                              <p:pRg st="4" end="4"/>
+                                            </p:txEl>
+                                          </p:spTgt>
+                                        </p:tgtEl>
+                                      </p:cBhvr>
+                                    </p:animEffect>
+                                  </p:childTnLst>
+                                </p:cTn>
+                              </p:par>
+                            </p:childTnLst>
+                          </p:cTn>
+                        </p:par>
+                      </p:childTnLst>
+                    </p:cTn>
+                  </p:par>
+                  <p:par>
+                    <p:cTn id="22" fill="hold">
+                      <p:stCondLst>
+                        <p:cond delay="indefinite"/>
+                      </p:stCondLst>
+                      <p:childTnLst>
+                        <p:par>
+                          <p:cTn id="23" fill="hold">
+                            <p:stCondLst>
+                              <p:cond delay="0"/>
+                            </p:stCondLst>
+                            <p:childTnLst>
+                              <p:par>
+                                <p:cTn id="24" presetID="10" presetClass="entr" presetSubtype="0" fill="hold" grpId="0" nodeType="clickEffect">
+                                  <p:stCondLst>
+                                    <p:cond delay="0"/>
+                                  </p:stCondLst>
+                                  <p:childTnLst>
+                                    <p:set>
+                                      <p:cBhvr>
+                                        <p:cTn id="25" dur="1" fill="hold">
+                                          <p:stCondLst>
+                                            <p:cond delay="0"/>
+                                          </p:stCondLst>
+                                        </p:cTn>
+                                        <p:tgtEl>
+                                          <p:spTgt spid="4">
+                                            <p:txEl>
+                                              <p:pRg st="5" end="5"/>
+                                            </p:txEl>
+                                          </p:spTgt>
+                                        </p:tgtEl>
+                                        <p:attrNameLst>
+                                          <p:attrName>style.visibility</p:attrName>
+                                        </p:attrNameLst>
+                                      </p:cBhvr>
+                                      <p:to>
+                                        <p:strVal val="visible"/>
+                                      </p:to>
+                                    </p:set>
+                                    <p:animEffect transition="in" filter="fade">
+                                      <p:cBhvr>
+                                        <p:cTn id="26" dur="500"/>
+                                        <p:tgtEl>
+                                          <p:spTgt spid="4">
+                                            <p:txEl>
+                                              <p:pRg st="5" end="5"/>
+                                            </p:txEl>
+                                          </p:spTgt>
+                                        </p:tgtEl>
+                                      </p:cBhvr>
+                                    </p:animEffect>
+                                  </p:childTnLst>
+                                </p:cTn>
+                              </p:par>
+                            </p:childTnLst>
+                          </p:cTn>
+                        </p:par>
+                      </p:childTnLst>
+                    </p:cTn>
+                  </p:par>
+                  <p:par>
+                    <p:cTn id="27" fill="hold">
+                      <p:stCondLst>
+                        <p:cond delay="indefinite"/>
+                      </p:stCondLst>
+                      <p:childTnLst>
+                        <p:par>
+                          <p:cTn id="28" fill="hold">
+                            <p:stCondLst>
+                              <p:cond delay="0"/>
+                            </p:stCondLst>
+                            <p:childTnLst>
+                              <p:par>
+                                <p:cTn id="29" presetID="10" presetClass="entr" presetSubtype="0" fill="hold" grpId="0" nodeType="clickEffect">
+                                  <p:stCondLst>
+                                    <p:cond delay="0"/>
+                                  </p:stCondLst>
+                                  <p:childTnLst>
+                                    <p:set>
+                                      <p:cBhvr>
+                                        <p:cTn id="30" dur="1" fill="hold">
+                                          <p:stCondLst>
+                                            <p:cond delay="0"/>
+                                          </p:stCondLst>
+                                        </p:cTn>
+                                        <p:tgtEl>
+                                          <p:spTgt spid="4">
+                                            <p:txEl>
+                                              <p:pRg st="6" end="6"/>
+                                            </p:txEl>
+                                          </p:spTgt>
+                                        </p:tgtEl>
+                                        <p:attrNameLst>
+                                          <p:attrName>style.visibility</p:attrName>
+                                        </p:attrNameLst>
+                                      </p:cBhvr>
+                                      <p:to>
+                                        <p:strVal val="visible"/>
+                                      </p:to>
+                                    </p:set>
+                                    <p:animEffect transition="in" filter="fade">
+                                      <p:cBhvr>
+                                        <p:cTn id="31" dur="500"/>
+                                        <p:tgtEl>
+                                          <p:spTgt spid="4">
+                                            <p:txEl>
+                                              <p:pRg st="6" end="6"/>
+                                            </p:txEl>
+                                          </p:spTgt>
+                                        </p:tgtEl>
+                                      </p:cBhvr>
+                                    </p:animEffect>
+                                  </p:childTnLst>
+                                </p:cTn>
+                              </p:par>
+                            </p:childTnLst>
+                          </p:cTn>
+                        </p:par>
+                      </p:childTnLst>
+                    </p:cTn>
+                  </p:par>
+                  <p:par>
+                    <p:cTn id="32" fill="hold">
+                      <p:stCondLst>
+                        <p:cond delay="indefinite"/>
+                      </p:stCondLst>
+                      <p:childTnLst>
+                        <p:par>
+                          <p:cTn id="33" fill="hold">
+                            <p:stCondLst>
+                              <p:cond delay="0"/>
+                            </p:stCondLst>
+                            <p:childTnLst>
+                              <p:par>
+                                <p:cTn id="34" presetID="10" presetClass="entr" presetSubtype="0" fill="hold" grpId="0" nodeType="clickEffect">
+                                  <p:stCondLst>
+                                    <p:cond delay="0"/>
+                                  </p:stCondLst>
+                                  <p:childTnLst>
+                                    <p:set>
+                                      <p:cBhvr>
+                                        <p:cTn id="35" dur="1" fill="hold">
+                                          <p:stCondLst>
+                                            <p:cond delay="0"/>
+                                          </p:stCondLst>
+                                        </p:cTn>
+                                        <p:tgtEl>
+                                          <p:spTgt spid="4">
+                                            <p:txEl>
+                                              <p:pRg st="7" end="7"/>
+                                            </p:txEl>
+                                          </p:spTgt>
+                                        </p:tgtEl>
+                                        <p:attrNameLst>
+                                          <p:attrName>style.visibility</p:attrName>
+                                        </p:attrNameLst>
+                                      </p:cBhvr>
+                                      <p:to>
+                                        <p:strVal val="visible"/>
+                                      </p:to>
+                                    </p:set>
+                                    <p:animEffect transition="in" filter="fade">
+                                      <p:cBhvr>
+                                        <p:cTn id="36" dur="500"/>
+                                        <p:tgtEl>
+                                          <p:spTgt spid="4">
+                                            <p:txEl>
+                                              <p:pRg st="7" end="7"/>
+                                            </p:txEl>
+                                          </p:spTgt>
+                                        </p:tgtEl>
+                                      </p:cBhvr>
+                                    </p:animEffect>
+                                  </p:childTnLst>
+                                </p:cTn>
+                              </p:par>
+                            </p:childTnLst>
+                          </p:cTn>
+                        </p:par>
+                      </p:childTnLst>
+                    </p:cTn>
+                  </p:par>
+                </p:childTnLst>
+              </p:cTn>
+              <p:prevCondLst>
+                <p:cond evt="onPrev" delay="0">
+                  <p:tgtEl>
+                    <p:sldTgt/>
+                  </p:tgtEl>
+                </p:cond>
+              </p:prevCondLst>
+              <p:nextCondLst>
+                <p:cond evt="onNext" delay="0">
+                  <p:tgtEl>
+                    <p:sldTgt/>
+                  </p:tgtEl>
+                </p:cond>
+              </p:nextCondLst>
+            </p:seq>
+          </p:childTnLst>
+        </p:cTn>
       </p:par>
     </p:tnLst>
+    <p:bldLst>
+      <p:bldP spid="4" grpId="0" build="p"/>
+    </p:bldLst>
   </p:timing>
 </p:sld>
 </file>
@@ -9315,6 +10847,308 @@
   <p:transition>
     <p:fade/>
   </p:transition>
+  <p:timing>
+    <p:tnLst>
+      <p:par>
+        <p:cTn id="1" dur="indefinite" restart="never" nodeType="tmRoot">
+          <p:childTnLst>
+            <p:seq concurrent="1" nextAc="seek">
+              <p:cTn id="2" dur="indefinite" nodeType="mainSeq">
+                <p:childTnLst>
+                  <p:par>
+                    <p:cTn id="3" fill="hold">
+                      <p:stCondLst>
+                        <p:cond delay="indefinite"/>
+                      </p:stCondLst>
+                      <p:childTnLst>
+                        <p:par>
+                          <p:cTn id="4" fill="hold">
+                            <p:stCondLst>
+                              <p:cond delay="0"/>
+                            </p:stCondLst>
+                            <p:childTnLst>
+                              <p:par>
+                                <p:cTn id="5" presetID="10" presetClass="entr" presetSubtype="0" fill="hold" grpId="0" nodeType="clickEffect">
+                                  <p:stCondLst>
+                                    <p:cond delay="0"/>
+                                  </p:stCondLst>
+                                  <p:childTnLst>
+                                    <p:set>
+                                      <p:cBhvr>
+                                        <p:cTn id="6" dur="1" fill="hold">
+                                          <p:stCondLst>
+                                            <p:cond delay="0"/>
+                                          </p:stCondLst>
+                                        </p:cTn>
+                                        <p:tgtEl>
+                                          <p:spTgt spid="3">
+                                            <p:txEl>
+                                              <p:pRg st="0" end="0"/>
+                                            </p:txEl>
+                                          </p:spTgt>
+                                        </p:tgtEl>
+                                        <p:attrNameLst>
+                                          <p:attrName>style.visibility</p:attrName>
+                                        </p:attrNameLst>
+                                      </p:cBhvr>
+                                      <p:to>
+                                        <p:strVal val="visible"/>
+                                      </p:to>
+                                    </p:set>
+                                    <p:animEffect transition="in" filter="fade">
+                                      <p:cBhvr>
+                                        <p:cTn id="7" dur="500"/>
+                                        <p:tgtEl>
+                                          <p:spTgt spid="3">
+                                            <p:txEl>
+                                              <p:pRg st="0" end="0"/>
+                                            </p:txEl>
+                                          </p:spTgt>
+                                        </p:tgtEl>
+                                      </p:cBhvr>
+                                    </p:animEffect>
+                                  </p:childTnLst>
+                                </p:cTn>
+                              </p:par>
+                            </p:childTnLst>
+                          </p:cTn>
+                        </p:par>
+                      </p:childTnLst>
+                    </p:cTn>
+                  </p:par>
+                  <p:par>
+                    <p:cTn id="8" fill="hold">
+                      <p:stCondLst>
+                        <p:cond delay="indefinite"/>
+                      </p:stCondLst>
+                      <p:childTnLst>
+                        <p:par>
+                          <p:cTn id="9" fill="hold">
+                            <p:stCondLst>
+                              <p:cond delay="0"/>
+                            </p:stCondLst>
+                            <p:childTnLst>
+                              <p:par>
+                                <p:cTn id="10" presetID="10" presetClass="entr" presetSubtype="0" fill="hold" grpId="0" nodeType="clickEffect">
+                                  <p:stCondLst>
+                                    <p:cond delay="0"/>
+                                  </p:stCondLst>
+                                  <p:childTnLst>
+                                    <p:set>
+                                      <p:cBhvr>
+                                        <p:cTn id="11" dur="1" fill="hold">
+                                          <p:stCondLst>
+                                            <p:cond delay="0"/>
+                                          </p:stCondLst>
+                                        </p:cTn>
+                                        <p:tgtEl>
+                                          <p:spTgt spid="3">
+                                            <p:txEl>
+                                              <p:pRg st="1" end="1"/>
+                                            </p:txEl>
+                                          </p:spTgt>
+                                        </p:tgtEl>
+                                        <p:attrNameLst>
+                                          <p:attrName>style.visibility</p:attrName>
+                                        </p:attrNameLst>
+                                      </p:cBhvr>
+                                      <p:to>
+                                        <p:strVal val="visible"/>
+                                      </p:to>
+                                    </p:set>
+                                    <p:animEffect transition="in" filter="fade">
+                                      <p:cBhvr>
+                                        <p:cTn id="12" dur="500"/>
+                                        <p:tgtEl>
+                                          <p:spTgt spid="3">
+                                            <p:txEl>
+                                              <p:pRg st="1" end="1"/>
+                                            </p:txEl>
+                                          </p:spTgt>
+                                        </p:tgtEl>
+                                      </p:cBhvr>
+                                    </p:animEffect>
+                                  </p:childTnLst>
+                                </p:cTn>
+                              </p:par>
+                              <p:par>
+                                <p:cTn id="13" presetID="10" presetClass="entr" presetSubtype="0" fill="hold" grpId="0" nodeType="withEffect">
+                                  <p:stCondLst>
+                                    <p:cond delay="0"/>
+                                  </p:stCondLst>
+                                  <p:childTnLst>
+                                    <p:set>
+                                      <p:cBhvr>
+                                        <p:cTn id="14" dur="1" fill="hold">
+                                          <p:stCondLst>
+                                            <p:cond delay="0"/>
+                                          </p:stCondLst>
+                                        </p:cTn>
+                                        <p:tgtEl>
+                                          <p:spTgt spid="3">
+                                            <p:txEl>
+                                              <p:pRg st="2" end="2"/>
+                                            </p:txEl>
+                                          </p:spTgt>
+                                        </p:tgtEl>
+                                        <p:attrNameLst>
+                                          <p:attrName>style.visibility</p:attrName>
+                                        </p:attrNameLst>
+                                      </p:cBhvr>
+                                      <p:to>
+                                        <p:strVal val="visible"/>
+                                      </p:to>
+                                    </p:set>
+                                    <p:animEffect transition="in" filter="fade">
+                                      <p:cBhvr>
+                                        <p:cTn id="15" dur="500"/>
+                                        <p:tgtEl>
+                                          <p:spTgt spid="3">
+                                            <p:txEl>
+                                              <p:pRg st="2" end="2"/>
+                                            </p:txEl>
+                                          </p:spTgt>
+                                        </p:tgtEl>
+                                      </p:cBhvr>
+                                    </p:animEffect>
+                                  </p:childTnLst>
+                                </p:cTn>
+                              </p:par>
+                            </p:childTnLst>
+                          </p:cTn>
+                        </p:par>
+                      </p:childTnLst>
+                    </p:cTn>
+                  </p:par>
+                  <p:par>
+                    <p:cTn id="16" fill="hold">
+                      <p:stCondLst>
+                        <p:cond delay="indefinite"/>
+                      </p:stCondLst>
+                      <p:childTnLst>
+                        <p:par>
+                          <p:cTn id="17" fill="hold">
+                            <p:stCondLst>
+                              <p:cond delay="0"/>
+                            </p:stCondLst>
+                            <p:childTnLst>
+                              <p:par>
+                                <p:cTn id="18" presetID="10" presetClass="entr" presetSubtype="0" fill="hold" grpId="0" nodeType="clickEffect">
+                                  <p:stCondLst>
+                                    <p:cond delay="0"/>
+                                  </p:stCondLst>
+                                  <p:childTnLst>
+                                    <p:set>
+                                      <p:cBhvr>
+                                        <p:cTn id="19" dur="1" fill="hold">
+                                          <p:stCondLst>
+                                            <p:cond delay="0"/>
+                                          </p:stCondLst>
+                                        </p:cTn>
+                                        <p:tgtEl>
+                                          <p:spTgt spid="3">
+                                            <p:txEl>
+                                              <p:pRg st="3" end="3"/>
+                                            </p:txEl>
+                                          </p:spTgt>
+                                        </p:tgtEl>
+                                        <p:attrNameLst>
+                                          <p:attrName>style.visibility</p:attrName>
+                                        </p:attrNameLst>
+                                      </p:cBhvr>
+                                      <p:to>
+                                        <p:strVal val="visible"/>
+                                      </p:to>
+                                    </p:set>
+                                    <p:animEffect transition="in" filter="fade">
+                                      <p:cBhvr>
+                                        <p:cTn id="20" dur="500"/>
+                                        <p:tgtEl>
+                                          <p:spTgt spid="3">
+                                            <p:txEl>
+                                              <p:pRg st="3" end="3"/>
+                                            </p:txEl>
+                                          </p:spTgt>
+                                        </p:tgtEl>
+                                      </p:cBhvr>
+                                    </p:animEffect>
+                                  </p:childTnLst>
+                                </p:cTn>
+                              </p:par>
+                              <p:par>
+                                <p:cTn id="21" presetID="10" presetClass="entr" presetSubtype="0" fill="hold" grpId="0" nodeType="withEffect">
+                                  <p:stCondLst>
+                                    <p:cond delay="0"/>
+                                  </p:stCondLst>
+                                  <p:childTnLst>
+                                    <p:set>
+                                      <p:cBhvr>
+                                        <p:cTn id="22" dur="1" fill="hold">
+                                          <p:stCondLst>
+                                            <p:cond delay="0"/>
+                                          </p:stCondLst>
+                                        </p:cTn>
+                                        <p:tgtEl>
+                                          <p:spTgt spid="3">
+                                            <p:txEl>
+                                              <p:pRg st="4" end="4"/>
+                                            </p:txEl>
+                                          </p:spTgt>
+                                        </p:tgtEl>
+                                        <p:attrNameLst>
+                                          <p:attrName>style.visibility</p:attrName>
+                                        </p:attrNameLst>
+                                      </p:cBhvr>
+                                      <p:to>
+                                        <p:strVal val="visible"/>
+                                      </p:to>
+                                    </p:set>
+                                    <p:animEffect transition="in" filter="fade">
+                                      <p:cBhvr>
+                                        <p:cTn id="23" dur="500"/>
+                                        <p:tgtEl>
+                                          <p:spTgt spid="3">
+                                            <p:txEl>
+                                              <p:pRg st="4" end="4"/>
+                                            </p:txEl>
+                                          </p:spTgt>
+                                        </p:tgtEl>
+                                      </p:cBhvr>
+                                    </p:animEffect>
+                                  </p:childTnLst>
+                                </p:cTn>
+                              </p:par>
+                            </p:childTnLst>
+                          </p:cTn>
+                        </p:par>
+                      </p:childTnLst>
+                    </p:cTn>
+                  </p:par>
+                </p:childTnLst>
+              </p:cTn>
+              <p:prevCondLst>
+                <p:cond evt="onPrev" delay="0">
+                  <p:tgtEl>
+                    <p:sldTgt/>
+                  </p:tgtEl>
+                </p:cond>
+              </p:prevCondLst>
+              <p:nextCondLst>
+                <p:cond evt="onNext" delay="0">
+                  <p:tgtEl>
+                    <p:sldTgt/>
+                  </p:tgtEl>
+                </p:cond>
+              </p:nextCondLst>
+            </p:seq>
+          </p:childTnLst>
+        </p:cTn>
+      </p:par>
+    </p:tnLst>
+    <p:bldLst>
+      <p:bldP spid="3" grpId="0" build="p"/>
+    </p:bldLst>
+  </p:timing>
 </p:sld>
 </file>
 
@@ -9411,7 +11245,7 @@
           <a:graphicData uri="http://schemas.openxmlformats.org/presentationml/2006/ole">
             <mc:AlternateContent xmlns:mc="http://schemas.openxmlformats.org/markup-compatibility/2006">
               <mc:Choice xmlns:v="urn:schemas-microsoft-com:vml" Requires="v">
-                <p:oleObj spid="_x0000_s1058" name="Worksheet" r:id="rId3" imgW="3505200" imgH="771525" progId="Excel.Sheet.12">
+                <p:oleObj spid="_x0000_s1079" name="Worksheet" r:id="rId3" imgW="3505200" imgH="771525" progId="Excel.Sheet.12">
                   <p:embed/>
                 </p:oleObj>
               </mc:Choice>
@@ -9619,6 +11453,60 @@
           </a:p>
         </p:txBody>
       </p:sp>
+      <p:pic>
+        <p:nvPicPr>
+          <p:cNvPr id="7171" name="Picture 3"/>
+          <p:cNvPicPr>
+            <a:picLocks noChangeAspect="1" noChangeArrowheads="1"/>
+          </p:cNvPicPr>
+          <p:nvPr/>
+        </p:nvPicPr>
+        <p:blipFill>
+          <a:blip r:embed="rId2">
+            <a:extLst>
+              <a:ext uri="{28A0092B-C50C-407E-A947-70E740481C1C}">
+                <a14:useLocalDpi xmlns:a14="http://schemas.microsoft.com/office/drawing/2010/main" val="0"/>
+              </a:ext>
+            </a:extLst>
+          </a:blip>
+          <a:srcRect/>
+          <a:stretch>
+            <a:fillRect/>
+          </a:stretch>
+        </p:blipFill>
+        <p:spPr bwMode="auto">
+          <a:xfrm>
+            <a:off x="1971675" y="1347788"/>
+            <a:ext cx="5200650" cy="2962275"/>
+          </a:xfrm>
+          <a:prstGeom prst="rect">
+            <a:avLst/>
+          </a:prstGeom>
+          <a:noFill/>
+          <a:ln>
+            <a:noFill/>
+          </a:ln>
+          <a:extLst>
+            <a:ext uri="{909E8E84-426E-40DD-AFC4-6F175D3DCCD1}">
+              <a14:hiddenFill xmlns:a14="http://schemas.microsoft.com/office/drawing/2010/main">
+                <a:solidFill>
+                  <a:schemeClr val="accent1"/>
+                </a:solidFill>
+              </a14:hiddenFill>
+            </a:ext>
+            <a:ext uri="{91240B29-F687-4F45-9708-019B960494DF}">
+              <a14:hiddenLine xmlns:a14="http://schemas.microsoft.com/office/drawing/2010/main" w="9525">
+                <a:solidFill>
+                  <a:schemeClr val="tx1"/>
+                </a:solidFill>
+                <a:miter lim="800000"/>
+                <a:headEnd/>
+                <a:tailEnd/>
+              </a14:hiddenLine>
+            </a:ext>
+          </a:extLst>
+        </p:spPr>
+      </p:pic>
     </p:spTree>
   </p:cSld>
   <p:clrMapOvr>
@@ -9630,9 +11518,324 @@
   <p:timing>
     <p:tnLst>
       <p:par>
-        <p:cTn id="1" dur="indefinite" restart="never" nodeType="tmRoot"/>
+        <p:cTn id="1" dur="indefinite" restart="never" nodeType="tmRoot">
+          <p:childTnLst>
+            <p:seq concurrent="1" nextAc="seek">
+              <p:cTn id="2" dur="indefinite" nodeType="mainSeq">
+                <p:childTnLst>
+                  <p:par>
+                    <p:cTn id="3" fill="hold">
+                      <p:stCondLst>
+                        <p:cond delay="indefinite"/>
+                      </p:stCondLst>
+                      <p:childTnLst>
+                        <p:par>
+                          <p:cTn id="4" fill="hold">
+                            <p:stCondLst>
+                              <p:cond delay="0"/>
+                            </p:stCondLst>
+                            <p:childTnLst>
+                              <p:par>
+                                <p:cTn id="5" presetID="10" presetClass="entr" presetSubtype="0" fill="hold" grpId="0" nodeType="clickEffect">
+                                  <p:stCondLst>
+                                    <p:cond delay="0"/>
+                                  </p:stCondLst>
+                                  <p:childTnLst>
+                                    <p:set>
+                                      <p:cBhvr>
+                                        <p:cTn id="6" dur="1" fill="hold">
+                                          <p:stCondLst>
+                                            <p:cond delay="0"/>
+                                          </p:stCondLst>
+                                        </p:cTn>
+                                        <p:tgtEl>
+                                          <p:spTgt spid="7">
+                                            <p:txEl>
+                                              <p:pRg st="0" end="0"/>
+                                            </p:txEl>
+                                          </p:spTgt>
+                                        </p:tgtEl>
+                                        <p:attrNameLst>
+                                          <p:attrName>style.visibility</p:attrName>
+                                        </p:attrNameLst>
+                                      </p:cBhvr>
+                                      <p:to>
+                                        <p:strVal val="visible"/>
+                                      </p:to>
+                                    </p:set>
+                                    <p:animEffect transition="in" filter="fade">
+                                      <p:cBhvr>
+                                        <p:cTn id="7" dur="500"/>
+                                        <p:tgtEl>
+                                          <p:spTgt spid="7">
+                                            <p:txEl>
+                                              <p:pRg st="0" end="0"/>
+                                            </p:txEl>
+                                          </p:spTgt>
+                                        </p:tgtEl>
+                                      </p:cBhvr>
+                                    </p:animEffect>
+                                  </p:childTnLst>
+                                </p:cTn>
+                              </p:par>
+                            </p:childTnLst>
+                          </p:cTn>
+                        </p:par>
+                      </p:childTnLst>
+                    </p:cTn>
+                  </p:par>
+                  <p:par>
+                    <p:cTn id="8" fill="hold">
+                      <p:stCondLst>
+                        <p:cond delay="indefinite"/>
+                      </p:stCondLst>
+                      <p:childTnLst>
+                        <p:par>
+                          <p:cTn id="9" fill="hold">
+                            <p:stCondLst>
+                              <p:cond delay="0"/>
+                            </p:stCondLst>
+                            <p:childTnLst>
+                              <p:par>
+                                <p:cTn id="10" presetID="10" presetClass="entr" presetSubtype="0" fill="hold" grpId="0" nodeType="clickEffect">
+                                  <p:stCondLst>
+                                    <p:cond delay="0"/>
+                                  </p:stCondLst>
+                                  <p:childTnLst>
+                                    <p:set>
+                                      <p:cBhvr>
+                                        <p:cTn id="11" dur="1" fill="hold">
+                                          <p:stCondLst>
+                                            <p:cond delay="0"/>
+                                          </p:stCondLst>
+                                        </p:cTn>
+                                        <p:tgtEl>
+                                          <p:spTgt spid="7">
+                                            <p:txEl>
+                                              <p:pRg st="1" end="1"/>
+                                            </p:txEl>
+                                          </p:spTgt>
+                                        </p:tgtEl>
+                                        <p:attrNameLst>
+                                          <p:attrName>style.visibility</p:attrName>
+                                        </p:attrNameLst>
+                                      </p:cBhvr>
+                                      <p:to>
+                                        <p:strVal val="visible"/>
+                                      </p:to>
+                                    </p:set>
+                                    <p:animEffect transition="in" filter="fade">
+                                      <p:cBhvr>
+                                        <p:cTn id="12" dur="500"/>
+                                        <p:tgtEl>
+                                          <p:spTgt spid="7">
+                                            <p:txEl>
+                                              <p:pRg st="1" end="1"/>
+                                            </p:txEl>
+                                          </p:spTgt>
+                                        </p:tgtEl>
+                                      </p:cBhvr>
+                                    </p:animEffect>
+                                  </p:childTnLst>
+                                </p:cTn>
+                              </p:par>
+                            </p:childTnLst>
+                          </p:cTn>
+                        </p:par>
+                      </p:childTnLst>
+                    </p:cTn>
+                  </p:par>
+                  <p:par>
+                    <p:cTn id="13" fill="hold">
+                      <p:stCondLst>
+                        <p:cond delay="indefinite"/>
+                      </p:stCondLst>
+                      <p:childTnLst>
+                        <p:par>
+                          <p:cTn id="14" fill="hold">
+                            <p:stCondLst>
+                              <p:cond delay="0"/>
+                            </p:stCondLst>
+                            <p:childTnLst>
+                              <p:par>
+                                <p:cTn id="15" presetID="10" presetClass="entr" presetSubtype="0" fill="hold" grpId="0" nodeType="clickEffect">
+                                  <p:stCondLst>
+                                    <p:cond delay="0"/>
+                                  </p:stCondLst>
+                                  <p:childTnLst>
+                                    <p:set>
+                                      <p:cBhvr>
+                                        <p:cTn id="16" dur="1" fill="hold">
+                                          <p:stCondLst>
+                                            <p:cond delay="0"/>
+                                          </p:stCondLst>
+                                        </p:cTn>
+                                        <p:tgtEl>
+                                          <p:spTgt spid="7">
+                                            <p:txEl>
+                                              <p:pRg st="2" end="2"/>
+                                            </p:txEl>
+                                          </p:spTgt>
+                                        </p:tgtEl>
+                                        <p:attrNameLst>
+                                          <p:attrName>style.visibility</p:attrName>
+                                        </p:attrNameLst>
+                                      </p:cBhvr>
+                                      <p:to>
+                                        <p:strVal val="visible"/>
+                                      </p:to>
+                                    </p:set>
+                                    <p:animEffect transition="in" filter="fade">
+                                      <p:cBhvr>
+                                        <p:cTn id="17" dur="500"/>
+                                        <p:tgtEl>
+                                          <p:spTgt spid="7">
+                                            <p:txEl>
+                                              <p:pRg st="2" end="2"/>
+                                            </p:txEl>
+                                          </p:spTgt>
+                                        </p:tgtEl>
+                                      </p:cBhvr>
+                                    </p:animEffect>
+                                  </p:childTnLst>
+                                </p:cTn>
+                              </p:par>
+                            </p:childTnLst>
+                          </p:cTn>
+                        </p:par>
+                      </p:childTnLst>
+                    </p:cTn>
+                  </p:par>
+                  <p:par>
+                    <p:cTn id="18" fill="hold">
+                      <p:stCondLst>
+                        <p:cond delay="indefinite"/>
+                      </p:stCondLst>
+                      <p:childTnLst>
+                        <p:par>
+                          <p:cTn id="19" fill="hold">
+                            <p:stCondLst>
+                              <p:cond delay="0"/>
+                            </p:stCondLst>
+                            <p:childTnLst>
+                              <p:par>
+                                <p:cTn id="20" presetID="10" presetClass="entr" presetSubtype="0" fill="hold" grpId="0" nodeType="clickEffect">
+                                  <p:stCondLst>
+                                    <p:cond delay="0"/>
+                                  </p:stCondLst>
+                                  <p:childTnLst>
+                                    <p:set>
+                                      <p:cBhvr>
+                                        <p:cTn id="21" dur="1" fill="hold">
+                                          <p:stCondLst>
+                                            <p:cond delay="0"/>
+                                          </p:stCondLst>
+                                        </p:cTn>
+                                        <p:tgtEl>
+                                          <p:spTgt spid="7">
+                                            <p:txEl>
+                                              <p:pRg st="3" end="3"/>
+                                            </p:txEl>
+                                          </p:spTgt>
+                                        </p:tgtEl>
+                                        <p:attrNameLst>
+                                          <p:attrName>style.visibility</p:attrName>
+                                        </p:attrNameLst>
+                                      </p:cBhvr>
+                                      <p:to>
+                                        <p:strVal val="visible"/>
+                                      </p:to>
+                                    </p:set>
+                                    <p:animEffect transition="in" filter="fade">
+                                      <p:cBhvr>
+                                        <p:cTn id="22" dur="500"/>
+                                        <p:tgtEl>
+                                          <p:spTgt spid="7">
+                                            <p:txEl>
+                                              <p:pRg st="3" end="3"/>
+                                            </p:txEl>
+                                          </p:spTgt>
+                                        </p:tgtEl>
+                                      </p:cBhvr>
+                                    </p:animEffect>
+                                  </p:childTnLst>
+                                </p:cTn>
+                              </p:par>
+                            </p:childTnLst>
+                          </p:cTn>
+                        </p:par>
+                      </p:childTnLst>
+                    </p:cTn>
+                  </p:par>
+                  <p:par>
+                    <p:cTn id="23" fill="hold">
+                      <p:stCondLst>
+                        <p:cond delay="indefinite"/>
+                      </p:stCondLst>
+                      <p:childTnLst>
+                        <p:par>
+                          <p:cTn id="24" fill="hold">
+                            <p:stCondLst>
+                              <p:cond delay="0"/>
+                            </p:stCondLst>
+                            <p:childTnLst>
+                              <p:par>
+                                <p:cTn id="25" presetID="1" presetClass="entr" presetSubtype="0" fill="hold" nodeType="clickEffect">
+                                  <p:stCondLst>
+                                    <p:cond delay="0"/>
+                                  </p:stCondLst>
+                                  <p:childTnLst>
+                                    <p:set>
+                                      <p:cBhvr>
+                                        <p:cTn id="26" dur="1" fill="hold">
+                                          <p:stCondLst>
+                                            <p:cond delay="0"/>
+                                          </p:stCondLst>
+                                        </p:cTn>
+                                        <p:tgtEl>
+                                          <p:spTgt spid="7171"/>
+                                        </p:tgtEl>
+                                        <p:attrNameLst>
+                                          <p:attrName>style.visibility</p:attrName>
+                                        </p:attrNameLst>
+                                      </p:cBhvr>
+                                      <p:to>
+                                        <p:strVal val="visible"/>
+                                      </p:to>
+                                    </p:set>
+                                  </p:childTnLst>
+                                </p:cTn>
+                              </p:par>
+                            </p:childTnLst>
+                          </p:cTn>
+                        </p:par>
+                      </p:childTnLst>
+                    </p:cTn>
+                  </p:par>
+                </p:childTnLst>
+              </p:cTn>
+              <p:prevCondLst>
+                <p:cond evt="onPrev" delay="0">
+                  <p:tgtEl>
+                    <p:sldTgt/>
+                  </p:tgtEl>
+                </p:cond>
+              </p:prevCondLst>
+              <p:nextCondLst>
+                <p:cond evt="onNext" delay="0">
+                  <p:tgtEl>
+                    <p:sldTgt/>
+                  </p:tgtEl>
+                </p:cond>
+              </p:nextCondLst>
+            </p:seq>
+          </p:childTnLst>
+        </p:cTn>
       </p:par>
     </p:tnLst>
+    <p:bldLst>
+      <p:bldP spid="7" grpId="0" build="p"/>
+    </p:bldLst>
   </p:timing>
 </p:sld>
 </file>
@@ -9768,7 +11971,7 @@
           <a:p>
             <a:r>
               <a:rPr lang="en-US" dirty="0" smtClean="0"/>
-              <a:t>Full morphology accuracy is 94%</a:t>
+              <a:t>POS + Segmentation accuracy is 94%</a:t>
             </a:r>
           </a:p>
           <a:p>
@@ -9792,9 +11995,231 @@
   <p:timing>
     <p:tnLst>
       <p:par>
-        <p:cTn id="1" dur="indefinite" restart="never" nodeType="tmRoot"/>
+        <p:cTn id="1" dur="indefinite" restart="never" nodeType="tmRoot">
+          <p:childTnLst>
+            <p:seq concurrent="1" nextAc="seek">
+              <p:cTn id="2" dur="indefinite" nodeType="mainSeq">
+                <p:childTnLst>
+                  <p:par>
+                    <p:cTn id="3" fill="hold">
+                      <p:stCondLst>
+                        <p:cond delay="indefinite"/>
+                      </p:stCondLst>
+                      <p:childTnLst>
+                        <p:par>
+                          <p:cTn id="4" fill="hold">
+                            <p:stCondLst>
+                              <p:cond delay="0"/>
+                            </p:stCondLst>
+                            <p:childTnLst>
+                              <p:par>
+                                <p:cTn id="5" presetID="1" presetClass="entr" presetSubtype="0" fill="hold" grpId="0" nodeType="clickEffect">
+                                  <p:stCondLst>
+                                    <p:cond delay="0"/>
+                                  </p:stCondLst>
+                                  <p:childTnLst>
+                                    <p:set>
+                                      <p:cBhvr>
+                                        <p:cTn id="6" dur="1" fill="hold">
+                                          <p:stCondLst>
+                                            <p:cond delay="0"/>
+                                          </p:stCondLst>
+                                        </p:cTn>
+                                        <p:tgtEl>
+                                          <p:spTgt spid="7">
+                                            <p:txEl>
+                                              <p:pRg st="0" end="0"/>
+                                            </p:txEl>
+                                          </p:spTgt>
+                                        </p:tgtEl>
+                                        <p:attrNameLst>
+                                          <p:attrName>style.visibility</p:attrName>
+                                        </p:attrNameLst>
+                                      </p:cBhvr>
+                                      <p:to>
+                                        <p:strVal val="visible"/>
+                                      </p:to>
+                                    </p:set>
+                                  </p:childTnLst>
+                                </p:cTn>
+                              </p:par>
+                            </p:childTnLst>
+                          </p:cTn>
+                        </p:par>
+                      </p:childTnLst>
+                    </p:cTn>
+                  </p:par>
+                  <p:par>
+                    <p:cTn id="7" fill="hold">
+                      <p:stCondLst>
+                        <p:cond delay="indefinite"/>
+                      </p:stCondLst>
+                      <p:childTnLst>
+                        <p:par>
+                          <p:cTn id="8" fill="hold">
+                            <p:stCondLst>
+                              <p:cond delay="0"/>
+                            </p:stCondLst>
+                            <p:childTnLst>
+                              <p:par>
+                                <p:cTn id="9" presetID="1" presetClass="entr" presetSubtype="0" fill="hold" grpId="0" nodeType="clickEffect">
+                                  <p:stCondLst>
+                                    <p:cond delay="0"/>
+                                  </p:stCondLst>
+                                  <p:childTnLst>
+                                    <p:set>
+                                      <p:cBhvr>
+                                        <p:cTn id="10" dur="1" fill="hold">
+                                          <p:stCondLst>
+                                            <p:cond delay="0"/>
+                                          </p:stCondLst>
+                                        </p:cTn>
+                                        <p:tgtEl>
+                                          <p:spTgt spid="7">
+                                            <p:txEl>
+                                              <p:pRg st="1" end="1"/>
+                                            </p:txEl>
+                                          </p:spTgt>
+                                        </p:tgtEl>
+                                        <p:attrNameLst>
+                                          <p:attrName>style.visibility</p:attrName>
+                                        </p:attrNameLst>
+                                      </p:cBhvr>
+                                      <p:to>
+                                        <p:strVal val="visible"/>
+                                      </p:to>
+                                    </p:set>
+                                  </p:childTnLst>
+                                </p:cTn>
+                              </p:par>
+                            </p:childTnLst>
+                          </p:cTn>
+                        </p:par>
+                      </p:childTnLst>
+                    </p:cTn>
+                  </p:par>
+                  <p:par>
+                    <p:cTn id="11" fill="hold">
+                      <p:stCondLst>
+                        <p:cond delay="indefinite"/>
+                      </p:stCondLst>
+                      <p:childTnLst>
+                        <p:par>
+                          <p:cTn id="12" fill="hold">
+                            <p:stCondLst>
+                              <p:cond delay="0"/>
+                            </p:stCondLst>
+                            <p:childTnLst>
+                              <p:par>
+                                <p:cTn id="13" presetID="1" presetClass="entr" presetSubtype="0" fill="hold" grpId="0" nodeType="clickEffect">
+                                  <p:stCondLst>
+                                    <p:cond delay="0"/>
+                                  </p:stCondLst>
+                                  <p:childTnLst>
+                                    <p:set>
+                                      <p:cBhvr>
+                                        <p:cTn id="14" dur="1" fill="hold">
+                                          <p:stCondLst>
+                                            <p:cond delay="0"/>
+                                          </p:stCondLst>
+                                        </p:cTn>
+                                        <p:tgtEl>
+                                          <p:spTgt spid="7">
+                                            <p:txEl>
+                                              <p:pRg st="2" end="2"/>
+                                            </p:txEl>
+                                          </p:spTgt>
+                                        </p:tgtEl>
+                                        <p:attrNameLst>
+                                          <p:attrName>style.visibility</p:attrName>
+                                        </p:attrNameLst>
+                                      </p:cBhvr>
+                                      <p:to>
+                                        <p:strVal val="visible"/>
+                                      </p:to>
+                                    </p:set>
+                                  </p:childTnLst>
+                                </p:cTn>
+                              </p:par>
+                            </p:childTnLst>
+                          </p:cTn>
+                        </p:par>
+                      </p:childTnLst>
+                    </p:cTn>
+                  </p:par>
+                  <p:par>
+                    <p:cTn id="15" fill="hold">
+                      <p:stCondLst>
+                        <p:cond delay="indefinite"/>
+                      </p:stCondLst>
+                      <p:childTnLst>
+                        <p:par>
+                          <p:cTn id="16" fill="hold">
+                            <p:stCondLst>
+                              <p:cond delay="0"/>
+                            </p:stCondLst>
+                            <p:childTnLst>
+                              <p:par>
+                                <p:cTn id="17" presetID="1" presetClass="entr" presetSubtype="0" fill="hold" grpId="0" nodeType="clickEffect">
+                                  <p:stCondLst>
+                                    <p:cond delay="0"/>
+                                  </p:stCondLst>
+                                  <p:childTnLst>
+                                    <p:set>
+                                      <p:cBhvr>
+                                        <p:cTn id="18" dur="1" fill="hold">
+                                          <p:stCondLst>
+                                            <p:cond delay="0"/>
+                                          </p:stCondLst>
+                                        </p:cTn>
+                                        <p:tgtEl>
+                                          <p:spTgt spid="7">
+                                            <p:txEl>
+                                              <p:pRg st="3" end="3"/>
+                                            </p:txEl>
+                                          </p:spTgt>
+                                        </p:tgtEl>
+                                        <p:attrNameLst>
+                                          <p:attrName>style.visibility</p:attrName>
+                                        </p:attrNameLst>
+                                      </p:cBhvr>
+                                      <p:to>
+                                        <p:strVal val="visible"/>
+                                      </p:to>
+                                    </p:set>
+                                  </p:childTnLst>
+                                </p:cTn>
+                              </p:par>
+                            </p:childTnLst>
+                          </p:cTn>
+                        </p:par>
+                      </p:childTnLst>
+                    </p:cTn>
+                  </p:par>
+                </p:childTnLst>
+              </p:cTn>
+              <p:prevCondLst>
+                <p:cond evt="onPrev" delay="0">
+                  <p:tgtEl>
+                    <p:sldTgt/>
+                  </p:tgtEl>
+                </p:cond>
+              </p:prevCondLst>
+              <p:nextCondLst>
+                <p:cond evt="onNext" delay="0">
+                  <p:tgtEl>
+                    <p:sldTgt/>
+                  </p:tgtEl>
+                </p:cond>
+              </p:nextCondLst>
+            </p:seq>
+          </p:childTnLst>
+        </p:cTn>
       </p:par>
     </p:tnLst>
+    <p:bldLst>
+      <p:bldP spid="7" grpId="0" build="p"/>
+    </p:bldLst>
   </p:timing>
 </p:sld>
 </file>
@@ -10136,6 +12561,13 @@
   <p:transition>
     <p:fade/>
   </p:transition>
+  <p:timing>
+    <p:tnLst>
+      <p:par>
+        <p:cTn id="1" dur="indefinite" restart="never" nodeType="tmRoot"/>
+      </p:par>
+    </p:tnLst>
+  </p:timing>
 </p:sld>
 </file>
 

</xml_diff>